<commit_message>
Poster Methods and Results part modified
</commit_message>
<xml_diff>
--- a/poster/poster_draft.pptx
+++ b/poster/poster_draft.pptx
@@ -277,7 +277,7 @@
             <a:tailEnd/>
           </a:ln>
           <a:extLst>
-            <a:ext uri="{909E8E84-426E-40DD-AFC4-6F175D3DCCD1}">
+            <a:ext uri="{909E8E84-426E-40dd-AFC4-6F175D3DCCD1}">
               <a14:hiddenFill xmlns:a14="http://schemas.microsoft.com/office/drawing/2010/main">
                 <a:solidFill>
                   <a:srgbClr val="FFFFFF"/>
@@ -610,14 +610,14 @@
           <a:noFill/>
           <a:ln/>
           <a:extLst>
-            <a:ext uri="{909E8E84-426E-40DD-AFC4-6F175D3DCCD1}">
+            <a:ext uri="{909E8E84-426E-40dd-AFC4-6F175D3DCCD1}">
               <a14:hiddenFill xmlns:a14="http://schemas.microsoft.com/office/drawing/2010/main">
                 <a:solidFill>
                   <a:srgbClr val="FFFFFF"/>
                 </a:solidFill>
               </a14:hiddenFill>
             </a:ext>
-            <a:ext uri="{91240B29-F687-4F45-9708-019B960494DF}">
+            <a:ext uri="{91240B29-F687-4f45-9708-019B960494DF}">
               <a14:hiddenLine xmlns:a14="http://schemas.microsoft.com/office/drawing/2010/main" w="9525">
                 <a:solidFill>
                   <a:srgbClr val="000000"/>
@@ -776,14 +776,14 @@
           <a:noFill/>
           <a:ln/>
           <a:extLst>
-            <a:ext uri="{909E8E84-426E-40DD-AFC4-6F175D3DCCD1}">
+            <a:ext uri="{909E8E84-426E-40dd-AFC4-6F175D3DCCD1}">
               <a14:hiddenFill xmlns:a14="http://schemas.microsoft.com/office/drawing/2010/main">
                 <a:solidFill>
                   <a:srgbClr val="FFFFFF"/>
                 </a:solidFill>
               </a14:hiddenFill>
             </a:ext>
-            <a:ext uri="{91240B29-F687-4F45-9708-019B960494DF}">
+            <a:ext uri="{91240B29-F687-4f45-9708-019B960494DF}">
               <a14:hiddenLine xmlns:a14="http://schemas.microsoft.com/office/drawing/2010/main" w="9525">
                 <a:solidFill>
                   <a:srgbClr val="000000"/>
@@ -3381,14 +3381,14 @@
             <a:noFill/>
           </a:ln>
           <a:extLst>
-            <a:ext uri="{909E8E84-426E-40DD-AFC4-6F175D3DCCD1}">
+            <a:ext uri="{909E8E84-426E-40dd-AFC4-6F175D3DCCD1}">
               <a14:hiddenFill xmlns:a14="http://schemas.microsoft.com/office/drawing/2010/main">
                 <a:solidFill>
                   <a:srgbClr val="FFFFFF"/>
                 </a:solidFill>
               </a14:hiddenFill>
             </a:ext>
-            <a:ext uri="{91240B29-F687-4F45-9708-019B960494DF}">
+            <a:ext uri="{91240B29-F687-4f45-9708-019B960494DF}">
               <a14:hiddenLine xmlns:a14="http://schemas.microsoft.com/office/drawing/2010/main" w="9525">
                 <a:solidFill>
                   <a:srgbClr val="000000"/>
@@ -3439,14 +3439,14 @@
             <a:noFill/>
           </a:ln>
           <a:extLst>
-            <a:ext uri="{909E8E84-426E-40DD-AFC4-6F175D3DCCD1}">
+            <a:ext uri="{909E8E84-426E-40dd-AFC4-6F175D3DCCD1}">
               <a14:hiddenFill xmlns:a14="http://schemas.microsoft.com/office/drawing/2010/main">
                 <a:solidFill>
                   <a:srgbClr val="FFFFFF"/>
                 </a:solidFill>
               </a14:hiddenFill>
             </a:ext>
-            <a:ext uri="{91240B29-F687-4F45-9708-019B960494DF}">
+            <a:ext uri="{91240B29-F687-4f45-9708-019B960494DF}">
               <a14:hiddenLine xmlns:a14="http://schemas.microsoft.com/office/drawing/2010/main" w="9525">
                 <a:solidFill>
                   <a:srgbClr val="000000"/>
@@ -4734,14 +4734,14 @@
             <a:noFill/>
           </a:ln>
           <a:extLst>
-            <a:ext uri="{909E8E84-426E-40DD-AFC4-6F175D3DCCD1}">
+            <a:ext uri="{909E8E84-426E-40dd-AFC4-6F175D3DCCD1}">
               <a14:hiddenFill xmlns:a14="http://schemas.microsoft.com/office/drawing/2010/main">
                 <a:solidFill>
                   <a:srgbClr val="FFFFFF"/>
                 </a:solidFill>
               </a14:hiddenFill>
             </a:ext>
-            <a:ext uri="{91240B29-F687-4F45-9708-019B960494DF}">
+            <a:ext uri="{91240B29-F687-4f45-9708-019B960494DF}">
               <a14:hiddenLine xmlns:a14="http://schemas.microsoft.com/office/drawing/2010/main" w="9525">
                 <a:solidFill>
                   <a:srgbClr val="000000"/>
@@ -5084,7 +5084,39 @@
                 </a:effectLst>
                 <a:latin typeface="Calibri" pitchFamily="34" charset="0"/>
               </a:rPr>
-              <a:t>Carnegie Mellon University   (Authors are listed in alphabetic order.)    </a:t>
+              <a:t>Carnegie Mellon University   (Authors are listed in </a:t>
+            </a:r>
+            <a:r>
+              <a:rPr lang="en-US" altLang="zh-CN" sz="4000" b="1" dirty="0" smtClean="0">
+                <a:solidFill>
+                  <a:schemeClr val="tx2"/>
+                </a:solidFill>
+                <a:effectLst>
+                  <a:outerShdw blurRad="38100" dist="38100" dir="2700000" algn="tl">
+                    <a:srgbClr val="000000">
+                      <a:alpha val="43137"/>
+                    </a:srgbClr>
+                  </a:outerShdw>
+                </a:effectLst>
+                <a:latin typeface="Calibri" pitchFamily="34" charset="0"/>
+              </a:rPr>
+              <a:t>alphabetical </a:t>
+            </a:r>
+            <a:r>
+              <a:rPr lang="en-US" altLang="zh-CN" sz="4000" b="1" dirty="0" smtClean="0">
+                <a:solidFill>
+                  <a:schemeClr val="tx2"/>
+                </a:solidFill>
+                <a:effectLst>
+                  <a:outerShdw blurRad="38100" dist="38100" dir="2700000" algn="tl">
+                    <a:srgbClr val="000000">
+                      <a:alpha val="43137"/>
+                    </a:srgbClr>
+                  </a:outerShdw>
+                </a:effectLst>
+                <a:latin typeface="Calibri" pitchFamily="34" charset="0"/>
+              </a:rPr>
+              <a:t>order.)    </a:t>
             </a:r>
             <a:endParaRPr lang="en-US" altLang="zh-CN" sz="4000" b="1" dirty="0">
               <a:solidFill>
@@ -5269,14 +5301,14 @@
             <a:noFill/>
           </a:ln>
           <a:extLst>
-            <a:ext uri="{909E8E84-426E-40DD-AFC4-6F175D3DCCD1}">
+            <a:ext uri="{909E8E84-426E-40dd-AFC4-6F175D3DCCD1}">
               <a14:hiddenFill xmlns:a14="http://schemas.microsoft.com/office/drawing/2010/main">
                 <a:solidFill>
                   <a:srgbClr val="FFFFFF"/>
                 </a:solidFill>
               </a14:hiddenFill>
             </a:ext>
-            <a:ext uri="{91240B29-F687-4F45-9708-019B960494DF}">
+            <a:ext uri="{91240B29-F687-4f45-9708-019B960494DF}">
               <a14:hiddenLine xmlns:a14="http://schemas.microsoft.com/office/drawing/2010/main" w="9525">
                 <a:solidFill>
                   <a:srgbClr val="000000"/>
@@ -6222,14 +6254,14 @@
             <a:noFill/>
           </a:ln>
           <a:extLst>
-            <a:ext uri="{909E8E84-426E-40DD-AFC4-6F175D3DCCD1}">
+            <a:ext uri="{909E8E84-426E-40dd-AFC4-6F175D3DCCD1}">
               <a14:hiddenFill xmlns:a14="http://schemas.microsoft.com/office/drawing/2010/main">
                 <a:solidFill>
                   <a:srgbClr val="FFFFFF"/>
                 </a:solidFill>
               </a14:hiddenFill>
             </a:ext>
-            <a:ext uri="{91240B29-F687-4F45-9708-019B960494DF}">
+            <a:ext uri="{91240B29-F687-4f45-9708-019B960494DF}">
               <a14:hiddenLine xmlns:a14="http://schemas.microsoft.com/office/drawing/2010/main" w="9525">
                 <a:solidFill>
                   <a:srgbClr val="000000"/>
@@ -6405,14 +6437,14 @@
             <a:noFill/>
           </a:ln>
           <a:extLst>
-            <a:ext uri="{909E8E84-426E-40DD-AFC4-6F175D3DCCD1}">
+            <a:ext uri="{909E8E84-426E-40dd-AFC4-6F175D3DCCD1}">
               <a14:hiddenFill xmlns:a14="http://schemas.microsoft.com/office/drawing/2010/main">
                 <a:solidFill>
                   <a:srgbClr val="FFFFFF"/>
                 </a:solidFill>
               </a14:hiddenFill>
             </a:ext>
-            <a:ext uri="{91240B29-F687-4F45-9708-019B960494DF}">
+            <a:ext uri="{91240B29-F687-4f45-9708-019B960494DF}">
               <a14:hiddenLine xmlns:a14="http://schemas.microsoft.com/office/drawing/2010/main" w="9525">
                 <a:solidFill>
                   <a:srgbClr val="000000"/>
@@ -6629,21 +6661,7 @@
                 <a:latin typeface="Trebuchet MS" panose="020B0603020202020204" pitchFamily="34" charset="0"/>
                 <a:ea typeface="PMingLiU" pitchFamily="18" charset="-120"/>
               </a:rPr>
-              <a:t> predictive modeling competition</a:t>
-            </a:r>
-            <a:r>
-              <a:rPr lang="en-US" altLang="zh-TW" sz="4400" dirty="0" smtClean="0">
-                <a:effectLst>
-                  <a:outerShdw blurRad="38100" dist="38100" dir="2700000" algn="tl">
-                    <a:srgbClr val="000000">
-                      <a:alpha val="43137"/>
-                    </a:srgbClr>
-                  </a:outerShdw>
-                </a:effectLst>
-                <a:latin typeface="Trebuchet MS" panose="020B0603020202020204" pitchFamily="34" charset="0"/>
-                <a:ea typeface="PMingLiU" pitchFamily="18" charset="-120"/>
-              </a:rPr>
-              <a:t>.  </a:t>
+              <a:t> predictive modeling competition.  </a:t>
             </a:r>
             <a:endParaRPr lang="en-US" altLang="zh-TW" sz="4400" dirty="0">
               <a:effectLst>
@@ -6670,7 +6688,7 @@
         <p:spPr bwMode="auto">
           <a:xfrm>
             <a:off x="14173200" y="5810369"/>
-            <a:ext cx="12573000" cy="9048631"/>
+            <a:ext cx="12573000" cy="11264621"/>
           </a:xfrm>
           <a:prstGeom prst="rect">
             <a:avLst/>
@@ -6680,14 +6698,14 @@
             <a:noFill/>
           </a:ln>
           <a:extLst>
-            <a:ext uri="{909E8E84-426E-40DD-AFC4-6F175D3DCCD1}">
+            <a:ext uri="{909E8E84-426E-40dd-AFC4-6F175D3DCCD1}">
               <a14:hiddenFill xmlns:a14="http://schemas.microsoft.com/office/drawing/2010/main">
                 <a:solidFill>
                   <a:srgbClr val="FFFFFF"/>
                 </a:solidFill>
               </a14:hiddenFill>
             </a:ext>
-            <a:ext uri="{91240B29-F687-4F45-9708-019B960494DF}">
+            <a:ext uri="{91240B29-F687-4f45-9708-019B960494DF}">
               <a14:hiddenLine xmlns:a14="http://schemas.microsoft.com/office/drawing/2010/main" w="9525">
                 <a:solidFill>
                   <a:srgbClr val="000000"/>
@@ -6812,7 +6830,7 @@
           </a:lstStyle>
           <a:p>
             <a:r>
-              <a:rPr lang="en-US" altLang="zh-TW" sz="6600" b="1" dirty="0">
+              <a:rPr lang="en-US" altLang="zh-TW" sz="6600" b="1" dirty="0" smtClean="0">
                 <a:solidFill>
                   <a:srgbClr val="C00000"/>
                 </a:solidFill>
@@ -6831,10 +6849,7 @@
             </a:r>
           </a:p>
           <a:p>
-            <a:endParaRPr lang="en-US" altLang="zh-TW" sz="3600" b="1" dirty="0">
-              <a:solidFill>
-                <a:schemeClr val="accent2"/>
-              </a:solidFill>
+            <a:endParaRPr lang="en-US" altLang="zh-TW" sz="800" dirty="0">
               <a:effectLst>
                 <a:outerShdw blurRad="38100" dist="38100" dir="2700000" algn="tl">
                   <a:srgbClr val="000000">
@@ -6853,46 +6868,7 @@
               <a:buChar char="•"/>
             </a:pPr>
             <a:r>
-              <a:rPr lang="en-US" altLang="zh-TW" sz="4800" dirty="0" smtClean="0">
-                <a:effectLst>
-                  <a:outerShdw blurRad="38100" dist="38100" dir="2700000" algn="tl">
-                    <a:srgbClr val="000000">
-                      <a:alpha val="43137"/>
-                    </a:srgbClr>
-                  </a:outerShdw>
-                </a:effectLst>
-                <a:latin typeface="Trebuchet MS" panose="020B0603020202020204" pitchFamily="34" charset="0"/>
-                <a:ea typeface="PMingLiU" pitchFamily="18" charset="-120"/>
-                <a:cs typeface="Calibri" pitchFamily="34" charset="0"/>
-              </a:rPr>
-              <a:t>Raw data</a:t>
-            </a:r>
-          </a:p>
-          <a:p>
-            <a:pPr>
-              <a:buFont typeface="Arial" charset="0"/>
-              <a:buChar char="•"/>
-            </a:pPr>
-            <a:endParaRPr lang="en-US" altLang="zh-TW" sz="4800" dirty="0">
-              <a:effectLst>
-                <a:outerShdw blurRad="38100" dist="38100" dir="2700000" algn="tl">
-                  <a:srgbClr val="000000">
-                    <a:alpha val="43137"/>
-                  </a:srgbClr>
-                </a:outerShdw>
-              </a:effectLst>
-              <a:latin typeface="Trebuchet MS" panose="020B0603020202020204" pitchFamily="34" charset="0"/>
-              <a:ea typeface="PMingLiU" pitchFamily="18" charset="-120"/>
-              <a:cs typeface="Calibri" pitchFamily="34" charset="0"/>
-            </a:endParaRPr>
-          </a:p>
-          <a:p>
-            <a:pPr>
-              <a:buFont typeface="Arial" charset="0"/>
-              <a:buChar char="•"/>
-            </a:pPr>
-            <a:r>
-              <a:rPr lang="en-US" altLang="zh-TW" sz="4800" dirty="0" smtClean="0">
+              <a:rPr lang="en-US" altLang="zh-TW" sz="4700" dirty="0" smtClean="0">
                 <a:effectLst>
                   <a:outerShdw blurRad="38100" dist="38100" dir="2700000" algn="tl">
                     <a:srgbClr val="000000">
@@ -6906,7 +6882,7 @@
               </a:rPr>
               <a:t>Preprocess</a:t>
             </a:r>
-            <a:endParaRPr lang="en-US" altLang="zh-TW" sz="4800" dirty="0">
+            <a:endParaRPr lang="en-US" altLang="zh-TW" sz="4700" dirty="0">
               <a:effectLst>
                 <a:outerShdw blurRad="38100" dist="38100" dir="2700000" algn="tl">
                   <a:srgbClr val="000000">
@@ -6924,7 +6900,70 @@
               <a:buFont typeface="Arial" charset="0"/>
               <a:buChar char="•"/>
             </a:pPr>
-            <a:endParaRPr lang="en-US" altLang="zh-TW" sz="4800" dirty="0">
+            <a:r>
+              <a:rPr lang="en-US" altLang="zh-TW" sz="4300" dirty="0" smtClean="0">
+                <a:effectLst>
+                  <a:outerShdw blurRad="38100" dist="38100" dir="2700000" algn="tl">
+                    <a:srgbClr val="000000">
+                      <a:alpha val="43137"/>
+                    </a:srgbClr>
+                  </a:outerShdw>
+                </a:effectLst>
+                <a:latin typeface="Trebuchet MS" panose="020B0603020202020204" pitchFamily="34" charset="0"/>
+                <a:ea typeface="PMingLiU" pitchFamily="18" charset="-120"/>
+                <a:cs typeface="Calibri" pitchFamily="34" charset="0"/>
+              </a:rPr>
+              <a:t>Segmentation</a:t>
+            </a:r>
+          </a:p>
+          <a:p>
+            <a:pPr marL="1463040" lvl="2" indent="0"/>
+            <a:r>
+              <a:rPr lang="en-US" altLang="zh-TW" sz="4000" dirty="0">
+                <a:effectLst>
+                  <a:outerShdw blurRad="38100" dist="38100" dir="2700000" algn="tl">
+                    <a:srgbClr val="000000">
+                      <a:alpha val="43137"/>
+                    </a:srgbClr>
+                  </a:outerShdw>
+                </a:effectLst>
+                <a:latin typeface="Trebuchet MS" panose="020B0603020202020204" pitchFamily="34" charset="0"/>
+                <a:ea typeface="PMingLiU" pitchFamily="18" charset="-120"/>
+                <a:cs typeface="Calibri" pitchFamily="34" charset="0"/>
+              </a:rPr>
+              <a:t>A</a:t>
+            </a:r>
+            <a:r>
+              <a:rPr lang="en-US" altLang="zh-TW" sz="4000" dirty="0" smtClean="0">
+                <a:effectLst>
+                  <a:outerShdw blurRad="38100" dist="38100" dir="2700000" algn="tl">
+                    <a:srgbClr val="000000">
+                      <a:alpha val="43137"/>
+                    </a:srgbClr>
+                  </a:outerShdw>
+                </a:effectLst>
+                <a:latin typeface="Trebuchet MS" panose="020B0603020202020204" pitchFamily="34" charset="0"/>
+                <a:ea typeface="PMingLiU" pitchFamily="18" charset="-120"/>
+                <a:cs typeface="Calibri" pitchFamily="34" charset="0"/>
+              </a:rPr>
+              <a:t>djacent s</a:t>
+            </a:r>
+            <a:r>
+              <a:rPr lang="en-US" altLang="zh-TW" sz="4000" dirty="0" smtClean="0">
+                <a:effectLst>
+                  <a:outerShdw blurRad="38100" dist="38100" dir="2700000" algn="tl">
+                    <a:srgbClr val="000000">
+                      <a:alpha val="43137"/>
+                    </a:srgbClr>
+                  </a:outerShdw>
+                </a:effectLst>
+                <a:latin typeface="Trebuchet MS" panose="020B0603020202020204" pitchFamily="34" charset="0"/>
+                <a:ea typeface="PMingLiU" pitchFamily="18" charset="-120"/>
+                <a:cs typeface="Calibri" pitchFamily="34" charset="0"/>
+              </a:rPr>
+              <a:t>ample points</a:t>
+            </a:r>
+            <a:endParaRPr lang="en-US" altLang="zh-TW" sz="4000" dirty="0">
               <a:effectLst>
                 <a:outerShdw blurRad="38100" dist="38100" dir="2700000" algn="tl">
                   <a:srgbClr val="000000">
@@ -6938,11 +6977,23 @@
             </a:endParaRPr>
           </a:p>
           <a:p>
-            <a:pPr lvl="2">
-              <a:buFont typeface="Arial" charset="0"/>
-              <a:buChar char="•"/>
-            </a:pPr>
-            <a:endParaRPr lang="en-US" altLang="zh-TW" sz="4800" dirty="0">
+            <a:pPr marL="1463040" lvl="2" indent="0"/>
+            <a:r>
+              <a:rPr lang="en-US" altLang="zh-TW" sz="4000" dirty="0" smtClean="0">
+                <a:effectLst>
+                  <a:outerShdw blurRad="38100" dist="38100" dir="2700000" algn="tl">
+                    <a:srgbClr val="000000">
+                      <a:alpha val="43137"/>
+                    </a:srgbClr>
+                  </a:outerShdw>
+                </a:effectLst>
+                <a:latin typeface="Trebuchet MS" panose="020B0603020202020204" pitchFamily="34" charset="0"/>
+                <a:ea typeface="PMingLiU" pitchFamily="18" charset="-120"/>
+                <a:cs typeface="Calibri" pitchFamily="34" charset="0"/>
+              </a:rPr>
+              <a:t>with time difference</a:t>
+            </a:r>
+            <a:endParaRPr lang="en-US" altLang="zh-TW" sz="4000" dirty="0">
               <a:effectLst>
                 <a:outerShdw blurRad="38100" dist="38100" dir="2700000" algn="tl">
                   <a:srgbClr val="000000">
@@ -6956,8 +7007,23 @@
             </a:endParaRPr>
           </a:p>
           <a:p>
-            <a:pPr marL="685800" lvl="2" indent="0"/>
-            <a:endParaRPr lang="en-US" altLang="zh-TW" sz="4800" dirty="0">
+            <a:pPr marL="1463040" lvl="2" indent="0"/>
+            <a:r>
+              <a:rPr lang="en-US" altLang="zh-TW" sz="4000" dirty="0" smtClean="0">
+                <a:effectLst>
+                  <a:outerShdw blurRad="38100" dist="38100" dir="2700000" algn="tl">
+                    <a:srgbClr val="000000">
+                      <a:alpha val="43137"/>
+                    </a:srgbClr>
+                  </a:outerShdw>
+                </a:effectLst>
+                <a:latin typeface="Trebuchet MS" panose="020B0603020202020204" pitchFamily="34" charset="0"/>
+                <a:ea typeface="PMingLiU" pitchFamily="18" charset="-120"/>
+                <a:cs typeface="Calibri" pitchFamily="34" charset="0"/>
+              </a:rPr>
+              <a:t>larger than 10s are segmented</a:t>
+            </a:r>
+            <a:endParaRPr lang="en-US" altLang="zh-TW" sz="4400" dirty="0" smtClean="0">
               <a:effectLst>
                 <a:outerShdw blurRad="38100" dist="38100" dir="2700000" algn="tl">
                   <a:srgbClr val="000000">
@@ -6975,7 +7041,76 @@
               <a:buFont typeface="Arial" charset="0"/>
               <a:buChar char="•"/>
             </a:pPr>
-            <a:endParaRPr lang="en-US" altLang="zh-TW" sz="4800" dirty="0">
+            <a:r>
+              <a:rPr lang="en-US" altLang="zh-TW" sz="4300" dirty="0">
+                <a:effectLst>
+                  <a:outerShdw blurRad="38100" dist="38100" dir="2700000" algn="tl">
+                    <a:srgbClr val="000000">
+                      <a:alpha val="43137"/>
+                    </a:srgbClr>
+                  </a:outerShdw>
+                </a:effectLst>
+                <a:latin typeface="Trebuchet MS" panose="020B0603020202020204" pitchFamily="34" charset="0"/>
+                <a:ea typeface="PMingLiU" pitchFamily="18" charset="-120"/>
+                <a:cs typeface="Calibri" pitchFamily="34" charset="0"/>
+              </a:rPr>
+              <a:t>Re-sampling</a:t>
+            </a:r>
+          </a:p>
+          <a:p>
+            <a:pPr marL="1463040" lvl="2" indent="0"/>
+            <a:r>
+              <a:rPr lang="en-US" altLang="zh-TW" sz="4000" dirty="0">
+                <a:effectLst>
+                  <a:outerShdw blurRad="38100" dist="38100" dir="2700000" algn="tl">
+                    <a:srgbClr val="000000">
+                      <a:alpha val="43137"/>
+                    </a:srgbClr>
+                  </a:outerShdw>
+                </a:effectLst>
+                <a:latin typeface="Trebuchet MS" panose="020B0603020202020204" pitchFamily="34" charset="0"/>
+                <a:ea typeface="PMingLiU" pitchFamily="18" charset="-120"/>
+                <a:cs typeface="Calibri" pitchFamily="34" charset="0"/>
+              </a:rPr>
+              <a:t>Uniformly re-sampling each sequence with fixed time </a:t>
+            </a:r>
+            <a:r>
+              <a:rPr lang="en-US" altLang="zh-TW" sz="4000" dirty="0" smtClean="0">
+                <a:effectLst>
+                  <a:outerShdw blurRad="38100" dist="38100" dir="2700000" algn="tl">
+                    <a:srgbClr val="000000">
+                      <a:alpha val="43137"/>
+                    </a:srgbClr>
+                  </a:outerShdw>
+                </a:effectLst>
+                <a:latin typeface="Trebuchet MS" panose="020B0603020202020204" pitchFamily="34" charset="0"/>
+                <a:ea typeface="PMingLiU" pitchFamily="18" charset="-120"/>
+                <a:cs typeface="Calibri" pitchFamily="34" charset="0"/>
+              </a:rPr>
+              <a:t>interval</a:t>
+            </a:r>
+          </a:p>
+          <a:p>
+            <a:pPr marL="457200" lvl="2" indent="-457200">
+              <a:buFont typeface="Arial" charset="0"/>
+              <a:buChar char="•"/>
+            </a:pPr>
+            <a:r>
+              <a:rPr lang="en-US" altLang="zh-TW" sz="4700" dirty="0">
+                <a:effectLst>
+                  <a:outerShdw blurRad="38100" dist="38100" dir="2700000" algn="tl">
+                    <a:srgbClr val="000000">
+                      <a:alpha val="43137"/>
+                    </a:srgbClr>
+                  </a:outerShdw>
+                </a:effectLst>
+                <a:latin typeface="Trebuchet MS" panose="020B0603020202020204" pitchFamily="34" charset="0"/>
+                <a:ea typeface="PMingLiU" pitchFamily="18" charset="-120"/>
+                <a:cs typeface="Calibri" pitchFamily="34" charset="0"/>
+              </a:rPr>
+              <a:t>Features</a:t>
+            </a:r>
+            <a:endParaRPr lang="en-US" altLang="zh-TW" sz="4700" dirty="0">
               <a:effectLst>
                 <a:outerShdw blurRad="38100" dist="38100" dir="2700000" algn="tl">
                   <a:srgbClr val="000000">
@@ -6993,7 +7128,37 @@
               <a:buFont typeface="Arial" charset="0"/>
               <a:buChar char="•"/>
             </a:pPr>
-            <a:endParaRPr lang="en-US" altLang="zh-TW" sz="4800" dirty="0">
+            <a:r>
+              <a:rPr lang="en-US" altLang="zh-TW" sz="4300" dirty="0">
+                <a:effectLst>
+                  <a:outerShdw blurRad="38100" dist="38100" dir="2700000" algn="tl">
+                    <a:srgbClr val="000000">
+                      <a:alpha val="43137"/>
+                    </a:srgbClr>
+                  </a:outerShdw>
+                </a:effectLst>
+                <a:latin typeface="Trebuchet MS" panose="020B0603020202020204" pitchFamily="34" charset="0"/>
+                <a:ea typeface="PMingLiU" pitchFamily="18" charset="-120"/>
+                <a:cs typeface="Calibri" pitchFamily="34" charset="0"/>
+              </a:rPr>
+              <a:t>Frequency domain </a:t>
+            </a:r>
+            <a:r>
+              <a:rPr lang="en-US" altLang="zh-TW" sz="4300" dirty="0" smtClean="0">
+                <a:effectLst>
+                  <a:outerShdw blurRad="38100" dist="38100" dir="2700000" algn="tl">
+                    <a:srgbClr val="000000">
+                      <a:alpha val="43137"/>
+                    </a:srgbClr>
+                  </a:outerShdw>
+                </a:effectLst>
+                <a:latin typeface="Trebuchet MS" panose="020B0603020202020204" pitchFamily="34" charset="0"/>
+                <a:ea typeface="PMingLiU" pitchFamily="18" charset="-120"/>
+                <a:cs typeface="Calibri" pitchFamily="34" charset="0"/>
+              </a:rPr>
+              <a:t>features (FFT)</a:t>
+            </a:r>
+            <a:endParaRPr lang="en-US" altLang="zh-TW" sz="4300" dirty="0">
               <a:effectLst>
                 <a:outerShdw blurRad="38100" dist="38100" dir="2700000" algn="tl">
                   <a:srgbClr val="000000">
@@ -7011,7 +7176,22 @@
               <a:buFont typeface="Arial" charset="0"/>
               <a:buChar char="•"/>
             </a:pPr>
-            <a:endParaRPr lang="en-US" altLang="zh-TW" sz="4800" dirty="0">
+            <a:r>
+              <a:rPr lang="en-US" altLang="zh-TW" sz="4300" dirty="0">
+                <a:effectLst>
+                  <a:outerShdw blurRad="38100" dist="38100" dir="2700000" algn="tl">
+                    <a:srgbClr val="000000">
+                      <a:alpha val="43137"/>
+                    </a:srgbClr>
+                  </a:outerShdw>
+                </a:effectLst>
+                <a:latin typeface="Trebuchet MS" panose="020B0603020202020204" pitchFamily="34" charset="0"/>
+                <a:ea typeface="PMingLiU" pitchFamily="18" charset="-120"/>
+                <a:cs typeface="Calibri" pitchFamily="34" charset="0"/>
+              </a:rPr>
+              <a:t>Statistic features</a:t>
+            </a:r>
+            <a:endParaRPr lang="en-US" altLang="zh-TW" sz="4300" dirty="0">
               <a:effectLst>
                 <a:outerShdw blurRad="38100" dist="38100" dir="2700000" algn="tl">
                   <a:srgbClr val="000000">
@@ -7025,12 +7205,12 @@
             </a:endParaRPr>
           </a:p>
           <a:p>
-            <a:pPr>
+            <a:pPr marL="457200" lvl="2" indent="-457200">
               <a:buFont typeface="Arial" charset="0"/>
               <a:buChar char="•"/>
             </a:pPr>
             <a:r>
-              <a:rPr lang="en-US" altLang="zh-TW" sz="4800" dirty="0" smtClean="0">
+              <a:rPr lang="en-US" altLang="zh-TW" sz="4700" dirty="0">
                 <a:effectLst>
                   <a:outerShdw blurRad="38100" dist="38100" dir="2700000" algn="tl">
                     <a:srgbClr val="000000">
@@ -7042,20 +7222,116 @@
                 <a:ea typeface="PMingLiU" pitchFamily="18" charset="-120"/>
                 <a:cs typeface="Calibri" pitchFamily="34" charset="0"/>
               </a:rPr>
-              <a:t>Classifier</a:t>
-            </a:r>
-            <a:endParaRPr lang="en-US" altLang="zh-TW" sz="4800" dirty="0">
-              <a:effectLst>
-                <a:outerShdw blurRad="38100" dist="38100" dir="2700000" algn="tl">
-                  <a:srgbClr val="000000">
-                    <a:alpha val="43137"/>
-                  </a:srgbClr>
-                </a:outerShdw>
-              </a:effectLst>
-              <a:latin typeface="Trebuchet MS" panose="020B0603020202020204" pitchFamily="34" charset="0"/>
-              <a:ea typeface="PMingLiU" pitchFamily="18" charset="-120"/>
-              <a:cs typeface="Calibri" pitchFamily="34" charset="0"/>
-            </a:endParaRPr>
+              <a:t>Classifiers</a:t>
+            </a:r>
+          </a:p>
+          <a:p>
+            <a:pPr lvl="2">
+              <a:buFont typeface="Arial" charset="0"/>
+              <a:buChar char="•"/>
+            </a:pPr>
+            <a:r>
+              <a:rPr lang="en-US" altLang="zh-TW" sz="4300" dirty="0">
+                <a:effectLst>
+                  <a:outerShdw blurRad="38100" dist="38100" dir="2700000" algn="tl">
+                    <a:srgbClr val="000000">
+                      <a:alpha val="43137"/>
+                    </a:srgbClr>
+                  </a:outerShdw>
+                </a:effectLst>
+                <a:latin typeface="Trebuchet MS" panose="020B0603020202020204" pitchFamily="34" charset="0"/>
+                <a:ea typeface="PMingLiU" pitchFamily="18" charset="-120"/>
+                <a:cs typeface="Calibri" pitchFamily="34" charset="0"/>
+              </a:rPr>
+              <a:t>k-</a:t>
+            </a:r>
+            <a:r>
+              <a:rPr lang="en-US" altLang="zh-TW" sz="4300" dirty="0">
+                <a:effectLst>
+                  <a:outerShdw blurRad="38100" dist="38100" dir="2700000" algn="tl">
+                    <a:srgbClr val="000000">
+                      <a:alpha val="43137"/>
+                    </a:srgbClr>
+                  </a:outerShdw>
+                </a:effectLst>
+                <a:latin typeface="Trebuchet MS" panose="020B0603020202020204" pitchFamily="34" charset="0"/>
+                <a:ea typeface="PMingLiU" pitchFamily="18" charset="-120"/>
+                <a:cs typeface="Calibri" pitchFamily="34" charset="0"/>
+              </a:rPr>
+              <a:t>NN</a:t>
+            </a:r>
+          </a:p>
+          <a:p>
+            <a:pPr lvl="2">
+              <a:buFont typeface="Arial" charset="0"/>
+              <a:buChar char="•"/>
+            </a:pPr>
+            <a:r>
+              <a:rPr lang="en-US" altLang="zh-TW" sz="4300" dirty="0">
+                <a:effectLst>
+                  <a:outerShdw blurRad="38100" dist="38100" dir="2700000" algn="tl">
+                    <a:srgbClr val="000000">
+                      <a:alpha val="43137"/>
+                    </a:srgbClr>
+                  </a:outerShdw>
+                </a:effectLst>
+                <a:latin typeface="Trebuchet MS" panose="020B0603020202020204" pitchFamily="34" charset="0"/>
+                <a:ea typeface="PMingLiU" pitchFamily="18" charset="-120"/>
+                <a:cs typeface="Calibri" pitchFamily="34" charset="0"/>
+              </a:rPr>
+              <a:t>SVM with RBF kernel</a:t>
+            </a:r>
+          </a:p>
+          <a:p>
+            <a:pPr lvl="2">
+              <a:buFont typeface="Arial" charset="0"/>
+              <a:buChar char="•"/>
+            </a:pPr>
+            <a:r>
+              <a:rPr lang="en-US" altLang="zh-TW" sz="4300" dirty="0">
+                <a:effectLst>
+                  <a:outerShdw blurRad="38100" dist="38100" dir="2700000" algn="tl">
+                    <a:srgbClr val="000000">
+                      <a:alpha val="43137"/>
+                    </a:srgbClr>
+                  </a:outerShdw>
+                </a:effectLst>
+                <a:latin typeface="Trebuchet MS" panose="020B0603020202020204" pitchFamily="34" charset="0"/>
+                <a:ea typeface="PMingLiU" pitchFamily="18" charset="-120"/>
+                <a:cs typeface="Calibri" pitchFamily="34" charset="0"/>
+              </a:rPr>
+              <a:t>L</a:t>
+            </a:r>
+            <a:r>
+              <a:rPr lang="en-US" altLang="zh-TW" sz="4300" baseline="-25000" dirty="0">
+                <a:effectLst>
+                  <a:outerShdw blurRad="38100" dist="38100" dir="2700000" algn="tl">
+                    <a:srgbClr val="000000">
+                      <a:alpha val="43137"/>
+                    </a:srgbClr>
+                  </a:outerShdw>
+                </a:effectLst>
+                <a:latin typeface="Trebuchet MS" panose="020B0603020202020204" pitchFamily="34" charset="0"/>
+                <a:ea typeface="PMingLiU" pitchFamily="18" charset="-120"/>
+                <a:cs typeface="Calibri" pitchFamily="34" charset="0"/>
+              </a:rPr>
+              <a:t>2</a:t>
+            </a:r>
+            <a:r>
+              <a:rPr lang="en-US" altLang="zh-TW" sz="4300" dirty="0">
+                <a:effectLst>
+                  <a:outerShdw blurRad="38100" dist="38100" dir="2700000" algn="tl">
+                    <a:srgbClr val="000000">
+                      <a:alpha val="43137"/>
+                    </a:srgbClr>
+                  </a:outerShdw>
+                </a:effectLst>
+                <a:latin typeface="Trebuchet MS" panose="020B0603020202020204" pitchFamily="34" charset="0"/>
+                <a:ea typeface="PMingLiU" pitchFamily="18" charset="-120"/>
+                <a:cs typeface="Calibri" pitchFamily="34" charset="0"/>
+              </a:rPr>
+              <a:t>-regularized logistic regression</a:t>
+            </a:r>
           </a:p>
         </p:txBody>
       </p:sp>
@@ -7212,7 +7488,7 @@
         <p:spPr bwMode="auto">
           <a:xfrm>
             <a:off x="14173200" y="17221200"/>
-            <a:ext cx="12573000" cy="6832640"/>
+            <a:ext cx="12573000" cy="10325902"/>
           </a:xfrm>
           <a:prstGeom prst="rect">
             <a:avLst/>
@@ -7222,14 +7498,14 @@
             <a:noFill/>
           </a:ln>
           <a:extLst>
-            <a:ext uri="{909E8E84-426E-40DD-AFC4-6F175D3DCCD1}">
+            <a:ext uri="{909E8E84-426E-40dd-AFC4-6F175D3DCCD1}">
               <a14:hiddenFill xmlns:a14="http://schemas.microsoft.com/office/drawing/2010/main">
                 <a:solidFill>
                   <a:srgbClr val="FFFFFF"/>
                 </a:solidFill>
               </a14:hiddenFill>
             </a:ext>
-            <a:ext uri="{91240B29-F687-4F45-9708-019B960494DF}">
+            <a:ext uri="{91240B29-F687-4f45-9708-019B960494DF}">
               <a14:hiddenLine xmlns:a14="http://schemas.microsoft.com/office/drawing/2010/main" w="9525">
                 <a:solidFill>
                   <a:srgbClr val="000000"/>
@@ -7371,23 +7647,6 @@
               </a:rPr>
               <a:t>Results</a:t>
             </a:r>
-            <a:endParaRPr lang="en-US" altLang="zh-TW" sz="6600" b="1" dirty="0">
-              <a:solidFill>
-                <a:srgbClr val="C00000"/>
-              </a:solidFill>
-              <a:effectLst>
-                <a:outerShdw blurRad="38100" dist="38100" dir="2700000" algn="tl">
-                  <a:srgbClr val="000000">
-                    <a:alpha val="43137"/>
-                  </a:srgbClr>
-                </a:outerShdw>
-              </a:effectLst>
-              <a:latin typeface="Trebuchet MS" panose="020B0603020202020204" pitchFamily="34" charset="0"/>
-              <a:ea typeface="PMingLiU" pitchFamily="18" charset="-120"/>
-              <a:cs typeface="Calibri" pitchFamily="34" charset="0"/>
-            </a:endParaRPr>
-          </a:p>
-          <a:p>
             <a:endParaRPr lang="en-US" altLang="zh-TW" sz="3600" b="1" dirty="0">
               <a:solidFill>
                 <a:schemeClr val="accent2"/>
@@ -7405,12 +7664,29 @@
             </a:endParaRPr>
           </a:p>
           <a:p>
-            <a:pPr>
+            <a:endParaRPr lang="en-US" altLang="zh-TW" sz="800" b="1" dirty="0">
+              <a:solidFill>
+                <a:schemeClr val="accent2"/>
+              </a:solidFill>
+              <a:effectLst>
+                <a:outerShdw blurRad="38100" dist="38100" dir="2700000" algn="tl">
+                  <a:srgbClr val="000000">
+                    <a:alpha val="43137"/>
+                  </a:srgbClr>
+                </a:outerShdw>
+              </a:effectLst>
+              <a:latin typeface="Trebuchet MS" panose="020B0603020202020204" pitchFamily="34" charset="0"/>
+              <a:ea typeface="PMingLiU" pitchFamily="18" charset="-120"/>
+              <a:cs typeface="Calibri" pitchFamily="34" charset="0"/>
+            </a:endParaRPr>
+          </a:p>
+          <a:p>
+            <a:pPr marL="457200" lvl="2" indent="-457200">
               <a:buFont typeface="Arial" charset="0"/>
               <a:buChar char="•"/>
             </a:pPr>
             <a:r>
-              <a:rPr lang="en-US" altLang="zh-TW" sz="4800" dirty="0" smtClean="0">
+              <a:rPr lang="en-US" altLang="zh-TW" sz="4700" dirty="0">
                 <a:effectLst>
                   <a:outerShdw blurRad="38100" dist="38100" dir="2700000" algn="tl">
                     <a:srgbClr val="000000">
@@ -7422,16 +7698,16 @@
                 <a:ea typeface="PMingLiU" pitchFamily="18" charset="-120"/>
                 <a:cs typeface="Calibri" pitchFamily="34" charset="0"/>
               </a:rPr>
-              <a:t>Parameter selection</a:t>
-            </a:r>
-          </a:p>
-          <a:p>
-            <a:pPr>
+              <a:t>Feature selection</a:t>
+            </a:r>
+          </a:p>
+          <a:p>
+            <a:pPr marL="1371600" lvl="2" indent="-685800">
               <a:buFont typeface="Arial" charset="0"/>
               <a:buChar char="•"/>
             </a:pPr>
             <a:r>
-              <a:rPr lang="en-US" altLang="zh-TW" sz="4800" dirty="0" smtClean="0">
+              <a:rPr lang="en-US" altLang="zh-TW" sz="4300" dirty="0">
                 <a:effectLst>
                   <a:outerShdw blurRad="38100" dist="38100" dir="2700000" algn="tl">
                     <a:srgbClr val="000000">
@@ -7443,16 +7719,16 @@
                 <a:ea typeface="PMingLiU" pitchFamily="18" charset="-120"/>
                 <a:cs typeface="Calibri" pitchFamily="34" charset="0"/>
               </a:rPr>
-              <a:t>Accuracy</a:t>
-            </a:r>
-          </a:p>
-          <a:p>
-            <a:pPr>
+              <a:t>FFT + statistics (tend to be unsafe)</a:t>
+            </a:r>
+          </a:p>
+          <a:p>
+            <a:pPr marL="1371600" lvl="2" indent="-685800">
               <a:buFont typeface="Arial" charset="0"/>
               <a:buChar char="•"/>
             </a:pPr>
             <a:r>
-              <a:rPr lang="en-US" altLang="zh-TW" sz="4800" dirty="0" smtClean="0">
+              <a:rPr lang="en-US" altLang="zh-TW" sz="4300" dirty="0">
                 <a:effectLst>
                   <a:outerShdw blurRad="38100" dist="38100" dir="2700000" algn="tl">
                     <a:srgbClr val="000000">
@@ -7464,16 +7740,16 @@
                 <a:ea typeface="PMingLiU" pitchFamily="18" charset="-120"/>
                 <a:cs typeface="Calibri" pitchFamily="34" charset="0"/>
               </a:rPr>
-              <a:t>Smaller data reduces accuracy?</a:t>
-            </a:r>
-          </a:p>
-          <a:p>
-            <a:pPr>
+              <a:t>Statistics only (safe)</a:t>
+            </a:r>
+          </a:p>
+          <a:p>
+            <a:pPr marL="457200" lvl="2" indent="-457200">
               <a:buFont typeface="Arial" charset="0"/>
               <a:buChar char="•"/>
             </a:pPr>
             <a:r>
-              <a:rPr lang="en-US" altLang="zh-TW" sz="4800" dirty="0" smtClean="0">
+              <a:rPr lang="en-US" altLang="zh-CN" sz="4700" dirty="0">
                 <a:effectLst>
                   <a:outerShdw blurRad="38100" dist="38100" dir="2700000" algn="tl">
                     <a:srgbClr val="000000">
@@ -7485,16 +7761,19 @@
                 <a:ea typeface="PMingLiU" pitchFamily="18" charset="-120"/>
                 <a:cs typeface="Calibri" pitchFamily="34" charset="0"/>
               </a:rPr>
-              <a:t>Features of sensor impact accuracy more than pattern of human ?</a:t>
-            </a:r>
-          </a:p>
-          <a:p>
-            <a:pPr lvl="2">
+              <a:t>Area under the ROC curve</a:t>
+            </a:r>
+          </a:p>
+          <a:p>
+            <a:pPr lvl="1">
               <a:buFont typeface="Arial" charset="0"/>
               <a:buChar char="•"/>
             </a:pPr>
             <a:r>
-              <a:rPr lang="en-US" altLang="zh-TW" sz="4800" dirty="0">
+              <a:rPr lang="en-US" altLang="zh-CN" sz="4800" dirty="0" smtClean="0">
+                <a:solidFill>
+                  <a:srgbClr val="FF0000"/>
+                </a:solidFill>
                 <a:effectLst>
                   <a:outerShdw blurRad="38100" dist="38100" dir="2700000" algn="tl">
                     <a:srgbClr val="000000">
@@ -7506,10 +7785,58 @@
                 <a:ea typeface="PMingLiU" pitchFamily="18" charset="-120"/>
                 <a:cs typeface="Calibri" pitchFamily="34" charset="0"/>
               </a:rPr>
-              <a:t> </a:t>
-            </a:r>
-            <a:r>
-              <a:rPr lang="en-US" altLang="zh-TW" sz="4800" dirty="0" smtClean="0">
+              <a:t>Insert the table here</a:t>
+            </a:r>
+          </a:p>
+          <a:p>
+            <a:pPr lvl="1">
+              <a:buFont typeface="Arial" charset="0"/>
+              <a:buChar char="•"/>
+            </a:pPr>
+            <a:endParaRPr lang="en-US" altLang="zh-CN" sz="4800" dirty="0">
+              <a:solidFill>
+                <a:srgbClr val="FF0000"/>
+              </a:solidFill>
+              <a:effectLst>
+                <a:outerShdw blurRad="38100" dist="38100" dir="2700000" algn="tl">
+                  <a:srgbClr val="000000">
+                    <a:alpha val="43137"/>
+                  </a:srgbClr>
+                </a:outerShdw>
+              </a:effectLst>
+              <a:latin typeface="Trebuchet MS" panose="020B0603020202020204" pitchFamily="34" charset="0"/>
+              <a:ea typeface="PMingLiU" pitchFamily="18" charset="-120"/>
+              <a:cs typeface="Calibri" pitchFamily="34" charset="0"/>
+            </a:endParaRPr>
+          </a:p>
+          <a:p>
+            <a:pPr lvl="1">
+              <a:buFont typeface="Arial" charset="0"/>
+              <a:buChar char="•"/>
+            </a:pPr>
+            <a:endParaRPr lang="en-US" altLang="zh-CN" sz="4800" dirty="0" smtClean="0">
+              <a:solidFill>
+                <a:srgbClr val="FF0000"/>
+              </a:solidFill>
+              <a:effectLst>
+                <a:outerShdw blurRad="38100" dist="38100" dir="2700000" algn="tl">
+                  <a:srgbClr val="000000">
+                    <a:alpha val="43137"/>
+                  </a:srgbClr>
+                </a:outerShdw>
+              </a:effectLst>
+              <a:latin typeface="Trebuchet MS" panose="020B0603020202020204" pitchFamily="34" charset="0"/>
+              <a:ea typeface="PMingLiU" pitchFamily="18" charset="-120"/>
+              <a:cs typeface="Calibri" pitchFamily="34" charset="0"/>
+            </a:endParaRPr>
+          </a:p>
+          <a:p>
+            <a:pPr marL="457200" lvl="2" indent="-457200">
+              <a:buFont typeface="Arial" charset="0"/>
+              <a:buChar char="•"/>
+            </a:pPr>
+            <a:r>
+              <a:rPr lang="en-US" altLang="zh-TW" sz="4700" dirty="0">
                 <a:effectLst>
                   <a:outerShdw blurRad="38100" dist="38100" dir="2700000" algn="tl">
                     <a:srgbClr val="000000">
@@ -7521,7 +7848,79 @@
                 <a:ea typeface="PMingLiU" pitchFamily="18" charset="-120"/>
                 <a:cs typeface="Calibri" pitchFamily="34" charset="0"/>
               </a:rPr>
-              <a:t> how to reduce it</a:t>
+              <a:t>Conclusions</a:t>
+            </a:r>
+          </a:p>
+          <a:p>
+            <a:pPr marL="1371600" lvl="2" indent="-685800">
+              <a:buFont typeface="Arial" charset="0"/>
+              <a:buChar char="•"/>
+            </a:pPr>
+            <a:r>
+              <a:rPr lang="en-US" altLang="zh-TW" sz="4300" dirty="0">
+                <a:effectLst>
+                  <a:outerShdw blurRad="38100" dist="38100" dir="2700000" algn="tl">
+                    <a:srgbClr val="000000">
+                      <a:alpha val="43137"/>
+                    </a:srgbClr>
+                  </a:outerShdw>
+                </a:effectLst>
+                <a:latin typeface="Trebuchet MS" panose="020B0603020202020204" pitchFamily="34" charset="0"/>
+                <a:ea typeface="PMingLiU" pitchFamily="18" charset="-120"/>
+                <a:cs typeface="Calibri" pitchFamily="34" charset="0"/>
+              </a:rPr>
+              <a:t>For high-dimensional features, linear methods tend to perform better</a:t>
+            </a:r>
+          </a:p>
+          <a:p>
+            <a:pPr marL="1371600" lvl="2" indent="-685800">
+              <a:buFont typeface="Arial" charset="0"/>
+              <a:buChar char="•"/>
+            </a:pPr>
+            <a:r>
+              <a:rPr lang="en-US" altLang="zh-TW" sz="4300">
+                <a:effectLst>
+                  <a:outerShdw blurRad="38100" dist="38100" dir="2700000" algn="tl">
+                    <a:srgbClr val="000000">
+                      <a:alpha val="43137"/>
+                    </a:srgbClr>
+                  </a:outerShdw>
+                </a:effectLst>
+                <a:latin typeface="Trebuchet MS" panose="020B0603020202020204" pitchFamily="34" charset="0"/>
+                <a:ea typeface="PMingLiU" pitchFamily="18" charset="-120"/>
+                <a:cs typeface="Calibri" pitchFamily="34" charset="0"/>
+              </a:rPr>
+              <a:t>R</a:t>
+            </a:r>
+            <a:r>
+              <a:rPr lang="en-US" altLang="zh-TW" sz="4300" smtClean="0">
+                <a:effectLst>
+                  <a:outerShdw blurRad="38100" dist="38100" dir="2700000" algn="tl">
+                    <a:srgbClr val="000000">
+                      <a:alpha val="43137"/>
+                    </a:srgbClr>
+                  </a:outerShdw>
+                </a:effectLst>
+                <a:latin typeface="Trebuchet MS" panose="020B0603020202020204" pitchFamily="34" charset="0"/>
+                <a:ea typeface="PMingLiU" pitchFamily="18" charset="-120"/>
+                <a:cs typeface="Calibri" pitchFamily="34" charset="0"/>
+              </a:rPr>
+              <a:t>esults </a:t>
+            </a:r>
+            <a:r>
+              <a:rPr lang="en-US" altLang="zh-TW" sz="4300" dirty="0">
+                <a:effectLst>
+                  <a:outerShdw blurRad="38100" dist="38100" dir="2700000" algn="tl">
+                    <a:srgbClr val="000000">
+                      <a:alpha val="43137"/>
+                    </a:srgbClr>
+                  </a:outerShdw>
+                </a:effectLst>
+                <a:latin typeface="Trebuchet MS" panose="020B0603020202020204" pitchFamily="34" charset="0"/>
+                <a:ea typeface="PMingLiU" pitchFamily="18" charset="-120"/>
+                <a:cs typeface="Calibri" pitchFamily="34" charset="0"/>
+              </a:rPr>
+              <a:t>of using safe feature is acceptable, but further improvement is needed</a:t>
             </a:r>
           </a:p>
           <a:p>
@@ -7529,8 +7928,15 @@
               <a:buFont typeface="Arial" charset="0"/>
               <a:buChar char="•"/>
             </a:pPr>
-            <a:endParaRPr lang="en-US" altLang="zh-TW" sz="4800" dirty="0">
-              <a:latin typeface="Calibri" pitchFamily="34" charset="0"/>
+            <a:endParaRPr lang="en-US" altLang="zh-TW" sz="4800" dirty="0" smtClean="0">
+              <a:effectLst>
+                <a:outerShdw blurRad="38100" dist="38100" dir="2700000" algn="tl">
+                  <a:srgbClr val="000000">
+                    <a:alpha val="43137"/>
+                  </a:srgbClr>
+                </a:outerShdw>
+              </a:effectLst>
+              <a:latin typeface="Trebuchet MS" panose="020B0603020202020204" pitchFamily="34" charset="0"/>
               <a:ea typeface="PMingLiU" pitchFamily="18" charset="-120"/>
               <a:cs typeface="Calibri" pitchFamily="34" charset="0"/>
             </a:endParaRPr>
@@ -7700,14 +8106,14 @@
             <a:noFill/>
           </a:ln>
           <a:extLst>
-            <a:ext uri="{909E8E84-426E-40DD-AFC4-6F175D3DCCD1}">
+            <a:ext uri="{909E8E84-426E-40dd-AFC4-6F175D3DCCD1}">
               <a14:hiddenFill xmlns:a14="http://schemas.microsoft.com/office/drawing/2010/main">
                 <a:solidFill>
                   <a:srgbClr val="FFFFFF"/>
                 </a:solidFill>
               </a14:hiddenFill>
             </a:ext>
-            <a:ext uri="{91240B29-F687-4F45-9708-019B960494DF}">
+            <a:ext uri="{91240B29-F687-4f45-9708-019B960494DF}">
               <a14:hiddenLine xmlns:a14="http://schemas.microsoft.com/office/drawing/2010/main" w="9525">
                 <a:solidFill>
                   <a:srgbClr val="000000"/>
@@ -8032,7 +8438,7 @@
           </a:prstGeom>
           <a:noFill/>
           <a:extLst>
-            <a:ext uri="{909E8E84-426E-40DD-AFC4-6F175D3DCCD1}">
+            <a:ext uri="{909E8E84-426E-40dd-AFC4-6F175D3DCCD1}">
               <a14:hiddenFill xmlns:a14="http://schemas.microsoft.com/office/drawing/2010/main">
                 <a:solidFill>
                   <a:srgbClr val="FFFFFF"/>
@@ -8125,7 +8531,7 @@
           </a:prstGeom>
           <a:noFill/>
           <a:extLst>
-            <a:ext uri="{909E8E84-426E-40DD-AFC4-6F175D3DCCD1}">
+            <a:ext uri="{909E8E84-426E-40dd-AFC4-6F175D3DCCD1}">
               <a14:hiddenFill xmlns:a14="http://schemas.microsoft.com/office/drawing/2010/main">
                 <a:solidFill>
                   <a:srgbClr val="FFFFFF"/>
@@ -8171,7 +8577,7 @@
             <a:softEdge rad="112500"/>
           </a:effectLst>
           <a:extLst>
-            <a:ext uri="{909E8E84-426E-40DD-AFC4-6F175D3DCCD1}">
+            <a:ext uri="{909E8E84-426E-40dd-AFC4-6F175D3DCCD1}">
               <a14:hiddenFill xmlns:a14="http://schemas.microsoft.com/office/drawing/2010/main">
                 <a:solidFill>
                   <a:srgbClr val="FFFFFF"/>
@@ -8212,7 +8618,7 @@
           </a:prstGeom>
           <a:noFill/>
           <a:extLst>
-            <a:ext uri="{909E8E84-426E-40DD-AFC4-6F175D3DCCD1}">
+            <a:ext uri="{909E8E84-426E-40dd-AFC4-6F175D3DCCD1}">
               <a14:hiddenFill xmlns:a14="http://schemas.microsoft.com/office/drawing/2010/main">
                 <a:solidFill>
                   <a:srgbClr val="FFFFFF"/>
@@ -8253,7 +8659,7 @@
           </a:prstGeom>
           <a:noFill/>
           <a:extLst>
-            <a:ext uri="{909E8E84-426E-40DD-AFC4-6F175D3DCCD1}">
+            <a:ext uri="{909E8E84-426E-40dd-AFC4-6F175D3DCCD1}">
               <a14:hiddenFill xmlns:a14="http://schemas.microsoft.com/office/drawing/2010/main">
                 <a:solidFill>
                   <a:srgbClr val="FFFFFF"/>
@@ -8313,7 +8719,7 @@
             </a:outerShdw>
           </a:effectLst>
           <a:extLst>
-            <a:ext uri="{909E8E84-426E-40DD-AFC4-6F175D3DCCD1}">
+            <a:ext uri="{909E8E84-426E-40dd-AFC4-6F175D3DCCD1}">
               <a14:hiddenFill xmlns:a14="http://schemas.microsoft.com/office/drawing/2010/main">
                 <a:solidFill>
                   <a:srgbClr val="FFFFFF"/>
@@ -8364,7 +8770,7 @@
           </a:prstGeom>
           <a:noFill/>
           <a:extLst>
-            <a:ext uri="{909E8E84-426E-40DD-AFC4-6F175D3DCCD1}">
+            <a:ext uri="{909E8E84-426E-40dd-AFC4-6F175D3DCCD1}">
               <a14:hiddenFill xmlns:a14="http://schemas.microsoft.com/office/drawing/2010/main">
                 <a:solidFill>
                   <a:srgbClr val="FFFFFF"/>
@@ -8442,7 +8848,7 @@
           </a:prstGeom>
           <a:noFill/>
           <a:extLst>
-            <a:ext uri="{909E8E84-426E-40DD-AFC4-6F175D3DCCD1}">
+            <a:ext uri="{909E8E84-426E-40dd-AFC4-6F175D3DCCD1}">
               <a14:hiddenFill xmlns:a14="http://schemas.microsoft.com/office/drawing/2010/main">
                 <a:solidFill>
                   <a:srgbClr val="FFFFFF"/>
@@ -8485,7 +8891,7 @@
         </p:blipFill>
         <p:spPr bwMode="auto">
           <a:xfrm>
-            <a:off x="20650200" y="5980008"/>
+            <a:off x="21183600" y="5668488"/>
             <a:ext cx="5753100" cy="4542312"/>
           </a:xfrm>
           <a:prstGeom prst="rect">
@@ -8493,7 +8899,7 @@
           </a:prstGeom>
           <a:noFill/>
           <a:extLst>
-            <a:ext uri="{909E8E84-426E-40DD-AFC4-6F175D3DCCD1}">
+            <a:ext uri="{909E8E84-426E-40dd-AFC4-6F175D3DCCD1}">
               <a14:hiddenFill xmlns:a14="http://schemas.microsoft.com/office/drawing/2010/main">
                 <a:solidFill>
                   <a:srgbClr val="FFFFFF"/>
@@ -8544,7 +8950,7 @@
           </a:prstGeom>
           <a:noFill/>
           <a:extLst>
-            <a:ext uri="{909E8E84-426E-40DD-AFC4-6F175D3DCCD1}">
+            <a:ext uri="{909E8E84-426E-40dd-AFC4-6F175D3DCCD1}">
               <a14:hiddenFill xmlns:a14="http://schemas.microsoft.com/office/drawing/2010/main">
                 <a:solidFill>
                   <a:srgbClr val="FFFFFF"/>
@@ -8562,7 +8968,7 @@
   <p:timing>
     <p:tnLst>
       <p:par>
-        <p:cTn id="1" dur="indefinite" restart="never" nodeType="tmRoot"/>
+        <p:cTn xmlns:p14="http://schemas.microsoft.com/office/powerpoint/2010/main" id="1" dur="indefinite" restart="never" nodeType="tmRoot"/>
       </p:par>
     </p:tnLst>
   </p:timing>

</xml_diff>